<commit_message>
Minor tweeks to presentatin
</commit_message>
<xml_diff>
--- a/P0076-presentation.pptx
+++ b/P0076-presentation.pptx
@@ -297,7 +297,7 @@
             <a:fld id="{5ACFD7B2-88A6-E34E-8EF8-CB0C7BA47ADD}" type="datetimeFigureOut">
               <a:rPr lang="en-US" smtClean="0"/>
               <a:pPr/>
-              <a:t>2/29/2016</a:t>
+              <a:t>8/17/2016</a:t>
             </a:fld>
             <a:endParaRPr lang="en-US"/>
           </a:p>
@@ -465,7 +465,7 @@
             <a:fld id="{ED7FC5FE-6F0D-D34A-8EE6-C95B4F5F4DC8}" type="datetimeFigureOut">
               <a:rPr lang="en-US" smtClean="0"/>
               <a:pPr/>
-              <a:t>2/29/2016</a:t>
+              <a:t>8/17/2016</a:t>
             </a:fld>
             <a:endParaRPr lang="en-US"/>
           </a:p>
@@ -1418,7 +1418,7 @@
           <a:p>
             <a:fld id="{359DE748-FCCC-4481-818E-7BD503A9C8FC}" type="datetimeFigureOut">
               <a:rPr lang="en-US" smtClean="0"/>
-              <a:t>2/29/2016</a:t>
+              <a:t>8/17/2016</a:t>
             </a:fld>
             <a:endParaRPr lang="en-US"/>
           </a:p>
@@ -5145,7 +5145,7 @@
           <a:p>
             <a:r>
               <a:rPr lang="en-US" dirty="0" smtClean="0"/>
-              <a:t>Template Library for Vector Loops</a:t>
+              <a:t>Execution Policy for Vector Loops</a:t>
             </a:r>
             <a:r>
               <a:rPr lang="en-US" dirty="0"/>
@@ -5156,11 +5156,7 @@
             </a:br>
             <a:r>
               <a:rPr lang="en-US" sz="1800" dirty="0" smtClean="0"/>
-              <a:t>A presentation of </a:t>
-            </a:r>
-            <a:r>
-              <a:rPr lang="en-US" sz="1800" dirty="0" smtClean="0"/>
-              <a:t>P0076</a:t>
+              <a:t>A presentation of P0076</a:t>
             </a:r>
             <a:endParaRPr lang="en-US" dirty="0"/>
           </a:p>
@@ -7085,15 +7081,7 @@
           <a:p>
             <a:r>
               <a:rPr lang="en-US" dirty="0" smtClean="0"/>
-              <a:t>Rules phrasing in P0076r0 are complete but complex.  </a:t>
-            </a:r>
-            <a:r>
-              <a:rPr lang="en-US" dirty="0" smtClean="0"/>
-              <a:t>W</a:t>
-            </a:r>
-            <a:r>
-              <a:rPr lang="en-US" dirty="0" smtClean="0"/>
-              <a:t>ording in R1 is much simpler.</a:t>
+              <a:t>Rules phrasing in P0076r0 are complete but complex.  Wording in R1 is much simpler.</a:t>
             </a:r>
             <a:endParaRPr lang="en-US" i="1" dirty="0"/>
           </a:p>
@@ -14591,11 +14579,7 @@
             </a:pPr>
             <a:r>
               <a:rPr lang="en-US" sz="2300" dirty="0" smtClean="0"/>
-              <a:t>Range </a:t>
-            </a:r>
-            <a:r>
-              <a:rPr lang="en-US" sz="2300" dirty="0" smtClean="0"/>
-              <a:t>of vector architectures supported</a:t>
+              <a:t>Range of vector architectures supported</a:t>
             </a:r>
           </a:p>
           <a:p>
@@ -14619,11 +14603,7 @@
             </a:pPr>
             <a:r>
               <a:rPr lang="en-US" sz="2300" dirty="0" smtClean="0"/>
-              <a:t>Wavefront </a:t>
-            </a:r>
-            <a:r>
-              <a:rPr lang="en-US" sz="2300" dirty="0" smtClean="0"/>
-              <a:t>execution: how vector execution differs from thread parallelism</a:t>
+              <a:t>Wavefront execution: how vector execution differs from thread parallelism</a:t>
             </a:r>
           </a:p>
           <a:p>
@@ -17473,13 +17453,8 @@
           <a:p>
             <a:r>
               <a:rPr lang="en-US" sz="2400" dirty="0" smtClean="0"/>
-              <a:t>Friendly to programmers already familiar with other </a:t>
-            </a:r>
-            <a:r>
-              <a:rPr lang="en-US" sz="2400" dirty="0" smtClean="0"/>
-              <a:t>parallel-programming and vector-programming systems (prior art)</a:t>
-            </a:r>
-            <a:endParaRPr lang="en-US" sz="2400" dirty="0" smtClean="0"/>
+              <a:t>Friendly to programmers already familiar with other parallel-programming and vector-programming systems (prior art)</a:t>
+            </a:r>
           </a:p>
           <a:p>
             <a:pPr lvl="1"/>
@@ -17674,7 +17649,7 @@
           <a:p>
             <a:fld id="{5D6F9C68-60C5-4059-89BC-24D256EE4BA9}" type="datetime3">
               <a:rPr lang="en-US" smtClean="0"/>
-              <a:t>29 February 2016</a:t>
+              <a:t>17 August 2016</a:t>
             </a:fld>
             <a:endParaRPr lang="en-US"/>
           </a:p>
@@ -17843,7 +17818,7 @@
           <a:p>
             <a:fld id="{9C6EDDC5-5F74-42A0-9266-46ADA719D9F1}" type="datetime3">
               <a:rPr lang="en-US" smtClean="0"/>
-              <a:t>29 February 2016</a:t>
+              <a:t>17 August 2016</a:t>
             </a:fld>
             <a:endParaRPr lang="en-US"/>
           </a:p>

</xml_diff>